<commit_message>
Additional Resources for idea and FE templates
</commit_message>
<xml_diff>
--- a/Presentations/Logistics/KNITS-SCM-Services.pptx
+++ b/Presentations/Logistics/KNITS-SCM-Services.pptx
@@ -27,44 +27,44 @@
   <p:notesSz cx="6858000" cy="9144000"/>
   <p:embeddedFontLst>
     <p:embeddedFont>
-      <p:font typeface="Barlow Light" charset="0"/>
+      <p:font typeface="Raleway SemiBold" charset="0"/>
       <p:regular r:id="rId17"/>
       <p:bold r:id="rId18"/>
       <p:italic r:id="rId19"/>
       <p:boldItalic r:id="rId20"/>
     </p:embeddedFont>
     <p:embeddedFont>
-      <p:font typeface="Barlow" charset="0"/>
+      <p:font typeface="맑은 고딕" pitchFamily="34" charset="-127"/>
       <p:regular r:id="rId21"/>
       <p:bold r:id="rId22"/>
-      <p:italic r:id="rId23"/>
-      <p:boldItalic r:id="rId24"/>
     </p:embeddedFont>
     <p:embeddedFont>
-      <p:font typeface="Raleway SemiBold" charset="0"/>
-      <p:regular r:id="rId25"/>
-      <p:bold r:id="rId26"/>
-      <p:italic r:id="rId27"/>
-      <p:boldItalic r:id="rId28"/>
+      <p:font typeface="Raleway" charset="0"/>
+      <p:regular r:id="rId23"/>
+      <p:bold r:id="rId24"/>
+      <p:italic r:id="rId25"/>
+      <p:boldItalic r:id="rId26"/>
+    </p:embeddedFont>
+    <p:embeddedFont>
+      <p:font typeface="Barlow Light" charset="0"/>
+      <p:regular r:id="rId27"/>
+      <p:bold r:id="rId28"/>
+      <p:italic r:id="rId29"/>
+      <p:boldItalic r:id="rId30"/>
     </p:embeddedFont>
     <p:embeddedFont>
       <p:font typeface="Calibri" pitchFamily="34" charset="0"/>
-      <p:regular r:id="rId29"/>
-      <p:bold r:id="rId30"/>
-      <p:italic r:id="rId31"/>
-      <p:boldItalic r:id="rId32"/>
+      <p:regular r:id="rId31"/>
+      <p:bold r:id="rId32"/>
+      <p:italic r:id="rId33"/>
+      <p:boldItalic r:id="rId34"/>
     </p:embeddedFont>
     <p:embeddedFont>
-      <p:font typeface="Raleway" charset="0"/>
-      <p:regular r:id="rId33"/>
-      <p:bold r:id="rId34"/>
-      <p:italic r:id="rId35"/>
-      <p:boldItalic r:id="rId36"/>
-    </p:embeddedFont>
-    <p:embeddedFont>
-      <p:font typeface="맑은 고딕" pitchFamily="34" charset="-127"/>
-      <p:regular r:id="rId37"/>
-      <p:bold r:id="rId38"/>
+      <p:font typeface="Barlow" charset="0"/>
+      <p:regular r:id="rId35"/>
+      <p:bold r:id="rId36"/>
+      <p:italic r:id="rId37"/>
+      <p:boldItalic r:id="rId38"/>
     </p:embeddedFont>
   </p:embeddedFontLst>
   <p:defaultTextStyle>
@@ -13660,7 +13660,7 @@
         </p:nvSpPr>
         <p:spPr>
           <a:xfrm>
-            <a:off x="3510553" y="1190405"/>
+            <a:off x="3458063" y="1213116"/>
             <a:ext cx="1257953" cy="566546"/>
           </a:xfrm>
           <a:prstGeom prst="rect">
@@ -14581,7 +14581,22 @@
             </a:pPr>
             <a:r>
               <a:rPr lang="et-EE" sz="1600" dirty="0" smtClean="0"/>
-              <a:t>Order Management</a:t>
+              <a:t>Order</a:t>
+            </a:r>
+            <a:r>
+              <a:rPr lang="en-US" sz="1600" dirty="0" smtClean="0"/>
+              <a:t/>
+            </a:r>
+            <a:br>
+              <a:rPr lang="en-US" sz="1600" dirty="0" smtClean="0"/>
+            </a:br>
+            <a:r>
+              <a:rPr lang="en-US" sz="1600" dirty="0" smtClean="0"/>
+              <a:t>M</a:t>
+            </a:r>
+            <a:r>
+              <a:rPr lang="et-EE" sz="1600" dirty="0" smtClean="0"/>
+              <a:t>anagement</a:t>
             </a:r>
             <a:endParaRPr lang="en-US" sz="1600" dirty="0"/>
           </a:p>
@@ -15318,8 +15333,15 @@
               <a:buNone/>
             </a:pPr>
             <a:r>
+              <a:rPr lang="en-US" sz="1600" dirty="0" smtClean="0"/>
+              <a:t>Warehouse</a:t>
+            </a:r>
+            <a:br>
+              <a:rPr lang="en-US" sz="1600" dirty="0" smtClean="0"/>
+            </a:br>
+            <a:r>
               <a:rPr lang="et-EE" sz="1600" dirty="0" smtClean="0"/>
-              <a:t>Facilities Management</a:t>
+              <a:t>Management</a:t>
             </a:r>
             <a:endParaRPr lang="en-US" sz="1600" dirty="0"/>
           </a:p>
@@ -19752,7 +19774,7 @@
         </p:nvSpPr>
         <p:spPr>
           <a:xfrm>
-            <a:off x="5748399" y="4120602"/>
+            <a:off x="5652120" y="4120602"/>
             <a:ext cx="1199865" cy="678195"/>
           </a:xfrm>
           <a:prstGeom prst="rect">
@@ -24545,8 +24567,16 @@
               <a:buNone/>
             </a:pPr>
             <a:r>
+              <a:rPr lang="en-US" sz="1600" b="1" dirty="0" smtClean="0"/>
+              <a:t>Distribution </a:t>
+            </a:r>
+            <a:r>
               <a:rPr lang="et-EE" sz="1600" b="1" dirty="0" smtClean="0"/>
-              <a:t>Tansport Management System</a:t>
+              <a:t>Management </a:t>
+            </a:r>
+            <a:r>
+              <a:rPr lang="et-EE" sz="1600" b="1" dirty="0" smtClean="0"/>
+              <a:t>System</a:t>
             </a:r>
             <a:endParaRPr lang="en-US" sz="1600" b="1" dirty="0"/>
           </a:p>
@@ -24562,8 +24592,8 @@
         </p:nvSpPr>
         <p:spPr>
           <a:xfrm>
-            <a:off x="2238083" y="1293184"/>
-            <a:ext cx="882158" cy="342462"/>
+            <a:off x="2205060" y="1148378"/>
+            <a:ext cx="1054817" cy="683539"/>
           </a:xfrm>
           <a:prstGeom prst="rect">
             <a:avLst/>
@@ -24829,8 +24859,12 @@
               <a:buNone/>
             </a:pPr>
             <a:r>
-              <a:rPr lang="et-EE" sz="1600" dirty="0" smtClean="0"/>
-              <a:t>Quote</a:t>
+              <a:rPr lang="en-US" sz="1600" dirty="0" err="1" smtClean="0"/>
+              <a:t>Warehouse</a:t>
+            </a:r>
+            <a:r>
+              <a:rPr lang="en-US" sz="1600" dirty="0" err="1" smtClean="0"/>
+              <a:t>Network</a:t>
             </a:r>
             <a:endParaRPr lang="en-US" sz="1600" dirty="0"/>
           </a:p>
@@ -24846,8 +24880,8 @@
         </p:nvSpPr>
         <p:spPr>
           <a:xfrm>
-            <a:off x="4114063" y="1285124"/>
-            <a:ext cx="766878" cy="377855"/>
+            <a:off x="3882706" y="1301221"/>
+            <a:ext cx="1259605" cy="377855"/>
           </a:xfrm>
           <a:prstGeom prst="rect">
             <a:avLst/>
@@ -25113,8 +25147,8 @@
               <a:buNone/>
             </a:pPr>
             <a:r>
-              <a:rPr lang="et-EE" sz="1600" dirty="0" smtClean="0"/>
-              <a:t>Booking</a:t>
+              <a:rPr lang="en-US" sz="1600" dirty="0" smtClean="0"/>
+              <a:t>Sales Orders</a:t>
             </a:r>
             <a:endParaRPr lang="en-US" sz="1600" dirty="0"/>
           </a:p>
@@ -25130,8 +25164,8 @@
         </p:nvSpPr>
         <p:spPr>
           <a:xfrm>
-            <a:off x="5523945" y="1275606"/>
-            <a:ext cx="1157196" cy="342462"/>
+            <a:off x="5523945" y="1131590"/>
+            <a:ext cx="1157196" cy="556311"/>
           </a:xfrm>
           <a:prstGeom prst="rect">
             <a:avLst/>
@@ -25397,8 +25431,15 @@
               <a:buNone/>
             </a:pPr>
             <a:r>
-              <a:rPr lang="et-EE" sz="1600" dirty="0" smtClean="0"/>
-              <a:t>Tracking</a:t>
+              <a:rPr lang="en-US" sz="1600" dirty="0" smtClean="0"/>
+              <a:t>Market</a:t>
+            </a:r>
+            <a:br>
+              <a:rPr lang="en-US" sz="1600" dirty="0" smtClean="0"/>
+            </a:br>
+            <a:r>
+              <a:rPr lang="en-US" sz="1600" dirty="0" smtClean="0"/>
+              <a:t>Channels</a:t>
             </a:r>
             <a:endParaRPr lang="en-US" sz="1600" dirty="0"/>
           </a:p>
@@ -25766,8 +25807,8 @@
               <a:buNone/>
             </a:pPr>
             <a:r>
-              <a:rPr lang="et-EE" sz="1600" dirty="0" smtClean="0"/>
-              <a:t>Routing</a:t>
+              <a:rPr lang="en-US" sz="1600" dirty="0" smtClean="0"/>
+              <a:t>POS</a:t>
             </a:r>
             <a:endParaRPr lang="en-US" sz="1600" dirty="0"/>
           </a:p>
@@ -25954,7 +25995,7 @@
         <p:spPr>
           <a:xfrm>
             <a:off x="5731246" y="4120602"/>
-            <a:ext cx="1199865" cy="678195"/>
+            <a:ext cx="1199865" cy="691085"/>
           </a:xfrm>
           <a:prstGeom prst="rect">
             <a:avLst/>
@@ -26220,340 +26261,21 @@
               <a:buNone/>
             </a:pPr>
             <a:r>
-              <a:rPr lang="et-EE" sz="1600" dirty="0" smtClean="0"/>
-              <a:t>Risk management</a:t>
+              <a:rPr lang="en-US" sz="1600" dirty="0" smtClean="0"/>
+              <a:t>Reverse Logistics</a:t>
             </a:r>
-            <a:endParaRPr lang="en-US" sz="1600" dirty="0"/>
           </a:p>
-        </p:txBody>
-      </p:sp>
-      <p:grpSp>
-        <p:nvGrpSpPr>
-          <p:cNvPr id="57" name="Google Shape;9046;p61"/>
-          <p:cNvGrpSpPr>
-            <a:grpSpLocks noChangeAspect="1"/>
-          </p:cNvGrpSpPr>
-          <p:nvPr/>
-        </p:nvGrpSpPr>
-        <p:grpSpPr>
-          <a:xfrm rot="16200000">
-            <a:off x="6783704" y="2749543"/>
-            <a:ext cx="71099" cy="454842"/>
-            <a:chOff x="2788083" y="3100241"/>
-            <a:chExt cx="15356" cy="98237"/>
-          </a:xfrm>
-        </p:grpSpPr>
-        <p:sp>
-          <p:nvSpPr>
-            <p:cNvPr id="58" name="Google Shape;9047;p61"/>
-            <p:cNvSpPr/>
-            <p:nvPr/>
-          </p:nvSpPr>
-          <p:spPr>
-            <a:xfrm>
-              <a:off x="2794655" y="3106808"/>
-              <a:ext cx="2213" cy="85118"/>
-            </a:xfrm>
-            <a:custGeom>
-              <a:avLst/>
-              <a:gdLst/>
-              <a:ahLst/>
-              <a:cxnLst/>
-              <a:rect l="l" t="t" r="r" b="b"/>
-              <a:pathLst>
-                <a:path w="486" h="18697" extrusionOk="0">
-                  <a:moveTo>
-                    <a:pt x="243" y="1"/>
-                  </a:moveTo>
-                  <a:cubicBezTo>
-                    <a:pt x="108" y="1"/>
-                    <a:pt x="1" y="109"/>
-                    <a:pt x="1" y="243"/>
-                  </a:cubicBezTo>
-                  <a:lnTo>
-                    <a:pt x="1" y="18455"/>
-                  </a:lnTo>
-                  <a:cubicBezTo>
-                    <a:pt x="1" y="18588"/>
-                    <a:pt x="108" y="18697"/>
-                    <a:pt x="243" y="18697"/>
-                  </a:cubicBezTo>
-                  <a:cubicBezTo>
-                    <a:pt x="377" y="18697"/>
-                    <a:pt x="485" y="18588"/>
-                    <a:pt x="485" y="18455"/>
-                  </a:cubicBezTo>
-                  <a:lnTo>
-                    <a:pt x="485" y="243"/>
-                  </a:lnTo>
-                  <a:cubicBezTo>
-                    <a:pt x="485" y="109"/>
-                    <a:pt x="377" y="1"/>
-                    <a:pt x="243" y="1"/>
-                  </a:cubicBezTo>
-                  <a:close/>
-                </a:path>
-              </a:pathLst>
-            </a:custGeom>
-            <a:solidFill>
-              <a:srgbClr val="9FA0A4"/>
-            </a:solidFill>
-            <a:ln>
-              <a:noFill/>
-            </a:ln>
-          </p:spPr>
-          <p:txBody>
-            <a:bodyPr spcFirstLastPara="1" wrap="square" lIns="91425" tIns="91425" rIns="91425" bIns="91425" anchor="ctr" anchorCtr="0">
-              <a:noAutofit/>
-            </a:bodyPr>
-            <a:lstStyle/>
-            <a:p>
-              <a:pPr marL="0" lvl="0" indent="0" algn="l" rtl="0">
-                <a:spcBef>
-                  <a:spcPts val="0"/>
-                </a:spcBef>
-                <a:spcAft>
-                  <a:spcPts val="0"/>
-                </a:spcAft>
-                <a:buNone/>
-              </a:pPr>
-              <a:endParaRPr/>
-            </a:p>
-          </p:txBody>
-        </p:sp>
-        <p:sp>
-          <p:nvSpPr>
-            <p:cNvPr id="59" name="Google Shape;9048;p61"/>
-            <p:cNvSpPr/>
-            <p:nvPr/>
-          </p:nvSpPr>
-          <p:spPr>
-            <a:xfrm>
-              <a:off x="2788083" y="3183117"/>
-              <a:ext cx="15356" cy="15360"/>
-            </a:xfrm>
-            <a:custGeom>
-              <a:avLst/>
-              <a:gdLst/>
-              <a:ahLst/>
-              <a:cxnLst/>
-              <a:rect l="l" t="t" r="r" b="b"/>
-              <a:pathLst>
-                <a:path w="3373" h="3374" extrusionOk="0">
-                  <a:moveTo>
-                    <a:pt x="1687" y="0"/>
-                  </a:moveTo>
-                  <a:cubicBezTo>
-                    <a:pt x="755" y="0"/>
-                    <a:pt x="1" y="755"/>
-                    <a:pt x="1" y="1687"/>
-                  </a:cubicBezTo>
-                  <a:cubicBezTo>
-                    <a:pt x="1" y="2619"/>
-                    <a:pt x="755" y="3373"/>
-                    <a:pt x="1687" y="3373"/>
-                  </a:cubicBezTo>
-                  <a:cubicBezTo>
-                    <a:pt x="2618" y="3373"/>
-                    <a:pt x="3372" y="2619"/>
-                    <a:pt x="3372" y="1687"/>
-                  </a:cubicBezTo>
-                  <a:cubicBezTo>
-                    <a:pt x="3372" y="755"/>
-                    <a:pt x="2618" y="0"/>
-                    <a:pt x="1687" y="0"/>
-                  </a:cubicBezTo>
-                  <a:close/>
-                </a:path>
-              </a:pathLst>
-            </a:custGeom>
-            <a:solidFill>
-              <a:srgbClr val="435D74"/>
-            </a:solidFill>
-            <a:ln>
-              <a:noFill/>
-            </a:ln>
-          </p:spPr>
-          <p:txBody>
-            <a:bodyPr spcFirstLastPara="1" wrap="square" lIns="91425" tIns="91425" rIns="91425" bIns="91425" anchor="ctr" anchorCtr="0">
-              <a:noAutofit/>
-            </a:bodyPr>
-            <a:lstStyle/>
-            <a:p>
-              <a:pPr marL="0" lvl="0" indent="0" algn="l" rtl="0">
-                <a:spcBef>
-                  <a:spcPts val="0"/>
-                </a:spcBef>
-                <a:spcAft>
-                  <a:spcPts val="0"/>
-                </a:spcAft>
-                <a:buNone/>
-              </a:pPr>
-              <a:endParaRPr/>
-            </a:p>
-          </p:txBody>
-        </p:sp>
-        <p:sp>
-          <p:nvSpPr>
-            <p:cNvPr id="61" name="Google Shape;9049;p61"/>
-            <p:cNvSpPr/>
-            <p:nvPr/>
-          </p:nvSpPr>
-          <p:spPr>
-            <a:xfrm>
-              <a:off x="2788083" y="3100241"/>
-              <a:ext cx="15356" cy="15356"/>
-            </a:xfrm>
-            <a:custGeom>
-              <a:avLst/>
-              <a:gdLst/>
-              <a:ahLst/>
-              <a:cxnLst/>
-              <a:rect l="l" t="t" r="r" b="b"/>
-              <a:pathLst>
-                <a:path w="3373" h="3373" extrusionOk="0">
-                  <a:moveTo>
-                    <a:pt x="1687" y="1"/>
-                  </a:moveTo>
-                  <a:cubicBezTo>
-                    <a:pt x="755" y="1"/>
-                    <a:pt x="1" y="754"/>
-                    <a:pt x="1" y="1686"/>
-                  </a:cubicBezTo>
-                  <a:cubicBezTo>
-                    <a:pt x="1" y="2618"/>
-                    <a:pt x="755" y="3372"/>
-                    <a:pt x="1687" y="3372"/>
-                  </a:cubicBezTo>
-                  <a:cubicBezTo>
-                    <a:pt x="2618" y="3372"/>
-                    <a:pt x="3372" y="2618"/>
-                    <a:pt x="3372" y="1686"/>
-                  </a:cubicBezTo>
-                  <a:cubicBezTo>
-                    <a:pt x="3372" y="754"/>
-                    <a:pt x="2618" y="1"/>
-                    <a:pt x="1687" y="1"/>
-                  </a:cubicBezTo>
-                  <a:close/>
-                </a:path>
-              </a:pathLst>
-            </a:custGeom>
-            <a:solidFill>
-              <a:srgbClr val="435D74"/>
-            </a:solidFill>
-            <a:ln>
-              <a:noFill/>
-            </a:ln>
-          </p:spPr>
-          <p:txBody>
-            <a:bodyPr spcFirstLastPara="1" wrap="square" lIns="91425" tIns="91425" rIns="91425" bIns="91425" anchor="ctr" anchorCtr="0">
-              <a:noAutofit/>
-            </a:bodyPr>
-            <a:lstStyle/>
-            <a:p>
-              <a:pPr marL="0" lvl="0" indent="0" algn="l" rtl="0">
-                <a:spcBef>
-                  <a:spcPts val="0"/>
-                </a:spcBef>
-                <a:spcAft>
-                  <a:spcPts val="0"/>
-                </a:spcAft>
-                <a:buNone/>
-              </a:pPr>
-              <a:endParaRPr/>
-            </a:p>
-          </p:txBody>
-        </p:sp>
-      </p:grpSp>
-      <p:sp>
-        <p:nvSpPr>
-          <p:cNvPr id="62" name="Google Shape;9026;p61"/>
-          <p:cNvSpPr/>
-          <p:nvPr/>
-        </p:nvSpPr>
-        <p:spPr>
-          <a:xfrm>
-            <a:off x="7113190" y="2606907"/>
-            <a:ext cx="1347242" cy="756931"/>
-          </a:xfrm>
-          <a:custGeom>
-            <a:avLst/>
-            <a:gdLst/>
-            <a:ahLst/>
-            <a:cxnLst/>
-            <a:rect l="l" t="t" r="r" b="b"/>
-            <a:pathLst>
-              <a:path w="49279" h="39990" extrusionOk="0">
-                <a:moveTo>
-                  <a:pt x="7997" y="1"/>
-                </a:moveTo>
-                <a:cubicBezTo>
-                  <a:pt x="3580" y="1"/>
-                  <a:pt x="0" y="3580"/>
-                  <a:pt x="0" y="7995"/>
-                </a:cubicBezTo>
-                <a:lnTo>
-                  <a:pt x="0" y="31993"/>
-                </a:lnTo>
-                <a:cubicBezTo>
-                  <a:pt x="0" y="36409"/>
-                  <a:pt x="3580" y="39989"/>
-                  <a:pt x="7997" y="39989"/>
-                </a:cubicBezTo>
-                <a:lnTo>
-                  <a:pt x="41282" y="39989"/>
-                </a:lnTo>
-                <a:cubicBezTo>
-                  <a:pt x="45697" y="39989"/>
-                  <a:pt x="49277" y="36409"/>
-                  <a:pt x="49277" y="31993"/>
-                </a:cubicBezTo>
-                <a:lnTo>
-                  <a:pt x="49277" y="7995"/>
-                </a:lnTo>
-                <a:cubicBezTo>
-                  <a:pt x="49278" y="3580"/>
-                  <a:pt x="45697" y="1"/>
-                  <a:pt x="41282" y="1"/>
-                </a:cubicBezTo>
-                <a:close/>
-              </a:path>
-            </a:pathLst>
-          </a:custGeom>
-          <a:noFill/>
-          <a:ln w="9525" cap="flat" cmpd="sng">
-            <a:solidFill>
-              <a:srgbClr val="657E93"/>
-            </a:solidFill>
-            <a:prstDash val="solid"/>
-            <a:round/>
-            <a:headEnd type="none" w="sm" len="sm"/>
-            <a:tailEnd type="none" w="sm" len="sm"/>
-          </a:ln>
-        </p:spPr>
-        <p:txBody>
-          <a:bodyPr spcFirstLastPara="1" wrap="square" lIns="91425" tIns="91425" rIns="91425" bIns="91425" anchor="ctr" anchorCtr="0">
-            <a:noAutofit/>
-          </a:bodyPr>
-          <a:lstStyle/>
           <a:p>
-            <a:pPr marL="0" lvl="0" indent="0" algn="l" rtl="0">
-              <a:spcBef>
-                <a:spcPts val="0"/>
-              </a:spcBef>
-              <a:spcAft>
-                <a:spcPts val="0"/>
-              </a:spcAft>
+            <a:pPr marL="0" indent="0" algn="ctr">
               <a:buNone/>
             </a:pPr>
-            <a:endParaRPr/>
+            <a:endParaRPr lang="en-US" sz="1600" dirty="0"/>
           </a:p>
         </p:txBody>
       </p:sp>
       <p:sp>
         <p:nvSpPr>
-          <p:cNvPr id="63" name="Google Shape;857;p19"/>
+          <p:cNvPr id="74" name="Google Shape;857;p19"/>
           <p:cNvSpPr txBox="1">
             <a:spLocks/>
           </p:cNvSpPr>
@@ -26561,8 +26283,8 @@
         </p:nvSpPr>
         <p:spPr>
           <a:xfrm>
-            <a:off x="7185197" y="2643758"/>
-            <a:ext cx="1199865" cy="678195"/>
+            <a:off x="3793583" y="4283355"/>
+            <a:ext cx="1445510" cy="376627"/>
           </a:xfrm>
           <a:prstGeom prst="rect">
             <a:avLst/>
@@ -26828,900 +26550,8 @@
               <a:buNone/>
             </a:pPr>
             <a:r>
-              <a:rPr lang="et-EE" sz="1600" dirty="0" smtClean="0"/>
-              <a:t>Intermodal logistics</a:t>
-            </a:r>
-            <a:endParaRPr lang="en-US" sz="1600" dirty="0"/>
-          </a:p>
-        </p:txBody>
-      </p:sp>
-      <p:grpSp>
-        <p:nvGrpSpPr>
-          <p:cNvPr id="68" name="Google Shape;9046;p61"/>
-          <p:cNvGrpSpPr>
-            <a:grpSpLocks noChangeAspect="1"/>
-          </p:cNvGrpSpPr>
-          <p:nvPr/>
-        </p:nvGrpSpPr>
-        <p:grpSpPr>
-          <a:xfrm rot="16200000">
-            <a:off x="2552533" y="2740827"/>
-            <a:ext cx="71099" cy="454842"/>
-            <a:chOff x="2788083" y="3100241"/>
-            <a:chExt cx="15356" cy="98237"/>
-          </a:xfrm>
-        </p:grpSpPr>
-        <p:sp>
-          <p:nvSpPr>
-            <p:cNvPr id="69" name="Google Shape;9047;p61"/>
-            <p:cNvSpPr/>
-            <p:nvPr/>
-          </p:nvSpPr>
-          <p:spPr>
-            <a:xfrm>
-              <a:off x="2794655" y="3106808"/>
-              <a:ext cx="2213" cy="85118"/>
-            </a:xfrm>
-            <a:custGeom>
-              <a:avLst/>
-              <a:gdLst/>
-              <a:ahLst/>
-              <a:cxnLst/>
-              <a:rect l="l" t="t" r="r" b="b"/>
-              <a:pathLst>
-                <a:path w="486" h="18697" extrusionOk="0">
-                  <a:moveTo>
-                    <a:pt x="243" y="1"/>
-                  </a:moveTo>
-                  <a:cubicBezTo>
-                    <a:pt x="108" y="1"/>
-                    <a:pt x="1" y="109"/>
-                    <a:pt x="1" y="243"/>
-                  </a:cubicBezTo>
-                  <a:lnTo>
-                    <a:pt x="1" y="18455"/>
-                  </a:lnTo>
-                  <a:cubicBezTo>
-                    <a:pt x="1" y="18588"/>
-                    <a:pt x="108" y="18697"/>
-                    <a:pt x="243" y="18697"/>
-                  </a:cubicBezTo>
-                  <a:cubicBezTo>
-                    <a:pt x="377" y="18697"/>
-                    <a:pt x="485" y="18588"/>
-                    <a:pt x="485" y="18455"/>
-                  </a:cubicBezTo>
-                  <a:lnTo>
-                    <a:pt x="485" y="243"/>
-                  </a:lnTo>
-                  <a:cubicBezTo>
-                    <a:pt x="485" y="109"/>
-                    <a:pt x="377" y="1"/>
-                    <a:pt x="243" y="1"/>
-                  </a:cubicBezTo>
-                  <a:close/>
-                </a:path>
-              </a:pathLst>
-            </a:custGeom>
-            <a:solidFill>
-              <a:srgbClr val="9FA0A4"/>
-            </a:solidFill>
-            <a:ln>
-              <a:noFill/>
-            </a:ln>
-          </p:spPr>
-          <p:txBody>
-            <a:bodyPr spcFirstLastPara="1" wrap="square" lIns="91425" tIns="91425" rIns="91425" bIns="91425" anchor="ctr" anchorCtr="0">
-              <a:noAutofit/>
-            </a:bodyPr>
-            <a:lstStyle/>
-            <a:p>
-              <a:pPr marL="0" lvl="0" indent="0" algn="l" rtl="0">
-                <a:spcBef>
-                  <a:spcPts val="0"/>
-                </a:spcBef>
-                <a:spcAft>
-                  <a:spcPts val="0"/>
-                </a:spcAft>
-                <a:buNone/>
-              </a:pPr>
-              <a:endParaRPr/>
-            </a:p>
-          </p:txBody>
-        </p:sp>
-        <p:sp>
-          <p:nvSpPr>
-            <p:cNvPr id="70" name="Google Shape;9048;p61"/>
-            <p:cNvSpPr/>
-            <p:nvPr/>
-          </p:nvSpPr>
-          <p:spPr>
-            <a:xfrm>
-              <a:off x="2788083" y="3183117"/>
-              <a:ext cx="15356" cy="15360"/>
-            </a:xfrm>
-            <a:custGeom>
-              <a:avLst/>
-              <a:gdLst/>
-              <a:ahLst/>
-              <a:cxnLst/>
-              <a:rect l="l" t="t" r="r" b="b"/>
-              <a:pathLst>
-                <a:path w="3373" h="3374" extrusionOk="0">
-                  <a:moveTo>
-                    <a:pt x="1687" y="0"/>
-                  </a:moveTo>
-                  <a:cubicBezTo>
-                    <a:pt x="755" y="0"/>
-                    <a:pt x="1" y="755"/>
-                    <a:pt x="1" y="1687"/>
-                  </a:cubicBezTo>
-                  <a:cubicBezTo>
-                    <a:pt x="1" y="2619"/>
-                    <a:pt x="755" y="3373"/>
-                    <a:pt x="1687" y="3373"/>
-                  </a:cubicBezTo>
-                  <a:cubicBezTo>
-                    <a:pt x="2618" y="3373"/>
-                    <a:pt x="3372" y="2619"/>
-                    <a:pt x="3372" y="1687"/>
-                  </a:cubicBezTo>
-                  <a:cubicBezTo>
-                    <a:pt x="3372" y="755"/>
-                    <a:pt x="2618" y="0"/>
-                    <a:pt x="1687" y="0"/>
-                  </a:cubicBezTo>
-                  <a:close/>
-                </a:path>
-              </a:pathLst>
-            </a:custGeom>
-            <a:solidFill>
-              <a:srgbClr val="435D74"/>
-            </a:solidFill>
-            <a:ln>
-              <a:noFill/>
-            </a:ln>
-          </p:spPr>
-          <p:txBody>
-            <a:bodyPr spcFirstLastPara="1" wrap="square" lIns="91425" tIns="91425" rIns="91425" bIns="91425" anchor="ctr" anchorCtr="0">
-              <a:noAutofit/>
-            </a:bodyPr>
-            <a:lstStyle/>
-            <a:p>
-              <a:pPr marL="0" lvl="0" indent="0" algn="l" rtl="0">
-                <a:spcBef>
-                  <a:spcPts val="0"/>
-                </a:spcBef>
-                <a:spcAft>
-                  <a:spcPts val="0"/>
-                </a:spcAft>
-                <a:buNone/>
-              </a:pPr>
-              <a:endParaRPr/>
-            </a:p>
-          </p:txBody>
-        </p:sp>
-        <p:sp>
-          <p:nvSpPr>
-            <p:cNvPr id="71" name="Google Shape;9049;p61"/>
-            <p:cNvSpPr/>
-            <p:nvPr/>
-          </p:nvSpPr>
-          <p:spPr>
-            <a:xfrm>
-              <a:off x="2788083" y="3100241"/>
-              <a:ext cx="15356" cy="15356"/>
-            </a:xfrm>
-            <a:custGeom>
-              <a:avLst/>
-              <a:gdLst/>
-              <a:ahLst/>
-              <a:cxnLst/>
-              <a:rect l="l" t="t" r="r" b="b"/>
-              <a:pathLst>
-                <a:path w="3373" h="3373" extrusionOk="0">
-                  <a:moveTo>
-                    <a:pt x="1687" y="1"/>
-                  </a:moveTo>
-                  <a:cubicBezTo>
-                    <a:pt x="755" y="1"/>
-                    <a:pt x="1" y="754"/>
-                    <a:pt x="1" y="1686"/>
-                  </a:cubicBezTo>
-                  <a:cubicBezTo>
-                    <a:pt x="1" y="2618"/>
-                    <a:pt x="755" y="3372"/>
-                    <a:pt x="1687" y="3372"/>
-                  </a:cubicBezTo>
-                  <a:cubicBezTo>
-                    <a:pt x="2618" y="3372"/>
-                    <a:pt x="3372" y="2618"/>
-                    <a:pt x="3372" y="1686"/>
-                  </a:cubicBezTo>
-                  <a:cubicBezTo>
-                    <a:pt x="3372" y="754"/>
-                    <a:pt x="2618" y="1"/>
-                    <a:pt x="1687" y="1"/>
-                  </a:cubicBezTo>
-                  <a:close/>
-                </a:path>
-              </a:pathLst>
-            </a:custGeom>
-            <a:solidFill>
-              <a:srgbClr val="435D74"/>
-            </a:solidFill>
-            <a:ln>
-              <a:noFill/>
-            </a:ln>
-          </p:spPr>
-          <p:txBody>
-            <a:bodyPr spcFirstLastPara="1" wrap="square" lIns="91425" tIns="91425" rIns="91425" bIns="91425" anchor="ctr" anchorCtr="0">
-              <a:noAutofit/>
-            </a:bodyPr>
-            <a:lstStyle/>
-            <a:p>
-              <a:pPr marL="0" lvl="0" indent="0" algn="l" rtl="0">
-                <a:spcBef>
-                  <a:spcPts val="0"/>
-                </a:spcBef>
-                <a:spcAft>
-                  <a:spcPts val="0"/>
-                </a:spcAft>
-                <a:buNone/>
-              </a:pPr>
-              <a:endParaRPr/>
-            </a:p>
-          </p:txBody>
-        </p:sp>
-      </p:grpSp>
-      <p:sp>
-        <p:nvSpPr>
-          <p:cNvPr id="72" name="Google Shape;9026;p61"/>
-          <p:cNvSpPr/>
-          <p:nvPr/>
-        </p:nvSpPr>
-        <p:spPr>
-          <a:xfrm>
-            <a:off x="920501" y="2571750"/>
-            <a:ext cx="1347242" cy="756931"/>
-          </a:xfrm>
-          <a:custGeom>
-            <a:avLst/>
-            <a:gdLst/>
-            <a:ahLst/>
-            <a:cxnLst/>
-            <a:rect l="l" t="t" r="r" b="b"/>
-            <a:pathLst>
-              <a:path w="49279" h="39990" extrusionOk="0">
-                <a:moveTo>
-                  <a:pt x="7997" y="1"/>
-                </a:moveTo>
-                <a:cubicBezTo>
-                  <a:pt x="3580" y="1"/>
-                  <a:pt x="0" y="3580"/>
-                  <a:pt x="0" y="7995"/>
-                </a:cubicBezTo>
-                <a:lnTo>
-                  <a:pt x="0" y="31993"/>
-                </a:lnTo>
-                <a:cubicBezTo>
-                  <a:pt x="0" y="36409"/>
-                  <a:pt x="3580" y="39989"/>
-                  <a:pt x="7997" y="39989"/>
-                </a:cubicBezTo>
-                <a:lnTo>
-                  <a:pt x="41282" y="39989"/>
-                </a:lnTo>
-                <a:cubicBezTo>
-                  <a:pt x="45697" y="39989"/>
-                  <a:pt x="49277" y="36409"/>
-                  <a:pt x="49277" y="31993"/>
-                </a:cubicBezTo>
-                <a:lnTo>
-                  <a:pt x="49277" y="7995"/>
-                </a:lnTo>
-                <a:cubicBezTo>
-                  <a:pt x="49278" y="3580"/>
-                  <a:pt x="45697" y="1"/>
-                  <a:pt x="41282" y="1"/>
-                </a:cubicBezTo>
-                <a:close/>
-              </a:path>
-            </a:pathLst>
-          </a:custGeom>
-          <a:noFill/>
-          <a:ln w="9525" cap="flat" cmpd="sng">
-            <a:solidFill>
-              <a:srgbClr val="657E93"/>
-            </a:solidFill>
-            <a:prstDash val="solid"/>
-            <a:round/>
-            <a:headEnd type="none" w="sm" len="sm"/>
-            <a:tailEnd type="none" w="sm" len="sm"/>
-          </a:ln>
-        </p:spPr>
-        <p:txBody>
-          <a:bodyPr spcFirstLastPara="1" wrap="square" lIns="91425" tIns="91425" rIns="91425" bIns="91425" anchor="ctr" anchorCtr="0">
-            <a:noAutofit/>
-          </a:bodyPr>
-          <a:lstStyle/>
-          <a:p>
-            <a:pPr marL="0" lvl="0" indent="0" algn="l" rtl="0">
-              <a:spcBef>
-                <a:spcPts val="0"/>
-              </a:spcBef>
-              <a:spcAft>
-                <a:spcPts val="0"/>
-              </a:spcAft>
-              <a:buNone/>
-            </a:pPr>
-            <a:endParaRPr/>
-          </a:p>
-        </p:txBody>
-      </p:sp>
-      <p:sp>
-        <p:nvSpPr>
-          <p:cNvPr id="73" name="Google Shape;857;p19"/>
-          <p:cNvSpPr txBox="1">
-            <a:spLocks/>
-          </p:cNvSpPr>
-          <p:nvPr/>
-        </p:nvSpPr>
-        <p:spPr>
-          <a:xfrm>
-            <a:off x="992508" y="2608601"/>
-            <a:ext cx="1199865" cy="678195"/>
-          </a:xfrm>
-          <a:prstGeom prst="rect">
-            <a:avLst/>
-          </a:prstGeom>
-          <a:noFill/>
-          <a:ln w="12700">
-            <a:noFill/>
-          </a:ln>
-        </p:spPr>
-        <p:txBody>
-          <a:bodyPr spcFirstLastPara="1" wrap="square" lIns="0" tIns="0" rIns="0" bIns="0" anchor="t" anchorCtr="0">
-            <a:noAutofit/>
-          </a:bodyPr>
-          <a:lstStyle>
-            <a:defPPr marR="0" lvl="0" algn="l" rtl="0">
-              <a:lnSpc>
-                <a:spcPct val="100000"/>
-              </a:lnSpc>
-              <a:spcBef>
-                <a:spcPts val="0"/>
-              </a:spcBef>
-              <a:spcAft>
-                <a:spcPts val="0"/>
-              </a:spcAft>
-            </a:defPPr>
-            <a:lvl1pPr marL="457200" marR="0" lvl="0" indent="-342900" algn="l" rtl="0">
-              <a:lnSpc>
-                <a:spcPct val="110000"/>
-              </a:lnSpc>
-              <a:spcBef>
-                <a:spcPts val="600"/>
-              </a:spcBef>
-              <a:spcAft>
-                <a:spcPts val="0"/>
-              </a:spcAft>
-              <a:buClr>
-                <a:schemeClr val="accent1"/>
-              </a:buClr>
-              <a:buSzPts val="1800"/>
-              <a:buFont typeface="Barlow Light"/>
-              <a:buChar char="▸"/>
-              <a:defRPr sz="2000" b="0" i="0" u="none" strike="noStrike" cap="none">
-                <a:solidFill>
-                  <a:schemeClr val="dk1"/>
-                </a:solidFill>
-                <a:latin typeface="Barlow Light"/>
-                <a:ea typeface="Barlow Light"/>
-                <a:cs typeface="Barlow Light"/>
-                <a:sym typeface="Barlow Light"/>
-              </a:defRPr>
-            </a:lvl1pPr>
-            <a:lvl2pPr marL="914400" marR="0" lvl="1" indent="-342900" algn="l" rtl="0">
-              <a:lnSpc>
-                <a:spcPct val="110000"/>
-              </a:lnSpc>
-              <a:spcBef>
-                <a:spcPts val="600"/>
-              </a:spcBef>
-              <a:spcAft>
-                <a:spcPts val="0"/>
-              </a:spcAft>
-              <a:buClr>
-                <a:schemeClr val="accent1"/>
-              </a:buClr>
-              <a:buSzPts val="1800"/>
-              <a:buFont typeface="Barlow Light"/>
-              <a:buChar char="▹"/>
-              <a:defRPr sz="2000" b="0" i="0" u="none" strike="noStrike" cap="none">
-                <a:solidFill>
-                  <a:schemeClr val="dk1"/>
-                </a:solidFill>
-                <a:latin typeface="Barlow Light"/>
-                <a:ea typeface="Barlow Light"/>
-                <a:cs typeface="Barlow Light"/>
-                <a:sym typeface="Barlow Light"/>
-              </a:defRPr>
-            </a:lvl2pPr>
-            <a:lvl3pPr marL="1371600" marR="0" lvl="2" indent="-342900" algn="l" rtl="0">
-              <a:lnSpc>
-                <a:spcPct val="110000"/>
-              </a:lnSpc>
-              <a:spcBef>
-                <a:spcPts val="600"/>
-              </a:spcBef>
-              <a:spcAft>
-                <a:spcPts val="0"/>
-              </a:spcAft>
-              <a:buClr>
-                <a:schemeClr val="accent1"/>
-              </a:buClr>
-              <a:buSzPts val="1800"/>
-              <a:buFont typeface="Barlow Light"/>
-              <a:buChar char="▹"/>
-              <a:defRPr sz="2000" b="0" i="0" u="none" strike="noStrike" cap="none">
-                <a:solidFill>
-                  <a:schemeClr val="dk1"/>
-                </a:solidFill>
-                <a:latin typeface="Barlow Light"/>
-                <a:ea typeface="Barlow Light"/>
-                <a:cs typeface="Barlow Light"/>
-                <a:sym typeface="Barlow Light"/>
-              </a:defRPr>
-            </a:lvl3pPr>
-            <a:lvl4pPr marL="1828800" marR="0" lvl="3" indent="-355600" algn="l" rtl="0">
-              <a:lnSpc>
-                <a:spcPct val="110000"/>
-              </a:lnSpc>
-              <a:spcBef>
-                <a:spcPts val="600"/>
-              </a:spcBef>
-              <a:spcAft>
-                <a:spcPts val="0"/>
-              </a:spcAft>
-              <a:buClr>
-                <a:schemeClr val="dk1"/>
-              </a:buClr>
-              <a:buSzPts val="2000"/>
-              <a:buFont typeface="Barlow Light"/>
-              <a:buChar char="▹"/>
-              <a:defRPr sz="2000" b="0" i="0" u="none" strike="noStrike" cap="none">
-                <a:solidFill>
-                  <a:schemeClr val="dk1"/>
-                </a:solidFill>
-                <a:latin typeface="Barlow Light"/>
-                <a:ea typeface="Barlow Light"/>
-                <a:cs typeface="Barlow Light"/>
-                <a:sym typeface="Barlow Light"/>
-              </a:defRPr>
-            </a:lvl4pPr>
-            <a:lvl5pPr marL="2286000" marR="0" lvl="4" indent="-355600" algn="l" rtl="0">
-              <a:lnSpc>
-                <a:spcPct val="110000"/>
-              </a:lnSpc>
-              <a:spcBef>
-                <a:spcPts val="600"/>
-              </a:spcBef>
-              <a:spcAft>
-                <a:spcPts val="0"/>
-              </a:spcAft>
-              <a:buClr>
-                <a:schemeClr val="dk1"/>
-              </a:buClr>
-              <a:buSzPts val="2000"/>
-              <a:buFont typeface="Barlow Light"/>
-              <a:buChar char="▹"/>
-              <a:defRPr sz="2000" b="0" i="0" u="none" strike="noStrike" cap="none">
-                <a:solidFill>
-                  <a:schemeClr val="dk1"/>
-                </a:solidFill>
-                <a:latin typeface="Barlow Light"/>
-                <a:ea typeface="Barlow Light"/>
-                <a:cs typeface="Barlow Light"/>
-                <a:sym typeface="Barlow Light"/>
-              </a:defRPr>
-            </a:lvl5pPr>
-            <a:lvl6pPr marL="2743200" marR="0" lvl="5" indent="-355600" algn="l" rtl="0">
-              <a:lnSpc>
-                <a:spcPct val="110000"/>
-              </a:lnSpc>
-              <a:spcBef>
-                <a:spcPts val="600"/>
-              </a:spcBef>
-              <a:spcAft>
-                <a:spcPts val="0"/>
-              </a:spcAft>
-              <a:buClr>
-                <a:schemeClr val="dk1"/>
-              </a:buClr>
-              <a:buSzPts val="2000"/>
-              <a:buFont typeface="Barlow Light"/>
-              <a:buChar char="▹"/>
-              <a:defRPr sz="2000" b="0" i="0" u="none" strike="noStrike" cap="none">
-                <a:solidFill>
-                  <a:schemeClr val="dk1"/>
-                </a:solidFill>
-                <a:latin typeface="Barlow Light"/>
-                <a:ea typeface="Barlow Light"/>
-                <a:cs typeface="Barlow Light"/>
-                <a:sym typeface="Barlow Light"/>
-              </a:defRPr>
-            </a:lvl6pPr>
-            <a:lvl7pPr marL="3200400" marR="0" lvl="6" indent="-355600" algn="l" rtl="0">
-              <a:lnSpc>
-                <a:spcPct val="110000"/>
-              </a:lnSpc>
-              <a:spcBef>
-                <a:spcPts val="600"/>
-              </a:spcBef>
-              <a:spcAft>
-                <a:spcPts val="0"/>
-              </a:spcAft>
-              <a:buClr>
-                <a:schemeClr val="dk1"/>
-              </a:buClr>
-              <a:buSzPts val="2000"/>
-              <a:buFont typeface="Barlow Light"/>
-              <a:buChar char="▹"/>
-              <a:defRPr sz="2000" b="0" i="0" u="none" strike="noStrike" cap="none">
-                <a:solidFill>
-                  <a:schemeClr val="dk1"/>
-                </a:solidFill>
-                <a:latin typeface="Barlow Light"/>
-                <a:ea typeface="Barlow Light"/>
-                <a:cs typeface="Barlow Light"/>
-                <a:sym typeface="Barlow Light"/>
-              </a:defRPr>
-            </a:lvl7pPr>
-            <a:lvl8pPr marL="3657600" marR="0" lvl="7" indent="-355600" algn="l" rtl="0">
-              <a:lnSpc>
-                <a:spcPct val="110000"/>
-              </a:lnSpc>
-              <a:spcBef>
-                <a:spcPts val="600"/>
-              </a:spcBef>
-              <a:spcAft>
-                <a:spcPts val="0"/>
-              </a:spcAft>
-              <a:buClr>
-                <a:schemeClr val="dk1"/>
-              </a:buClr>
-              <a:buSzPts val="2000"/>
-              <a:buFont typeface="Barlow Light"/>
-              <a:buChar char="▹"/>
-              <a:defRPr sz="2000" b="0" i="0" u="none" strike="noStrike" cap="none">
-                <a:solidFill>
-                  <a:schemeClr val="dk1"/>
-                </a:solidFill>
-                <a:latin typeface="Barlow Light"/>
-                <a:ea typeface="Barlow Light"/>
-                <a:cs typeface="Barlow Light"/>
-                <a:sym typeface="Barlow Light"/>
-              </a:defRPr>
-            </a:lvl8pPr>
-            <a:lvl9pPr marL="4114800" marR="0" lvl="8" indent="-355600" algn="l" rtl="0">
-              <a:lnSpc>
-                <a:spcPct val="110000"/>
-              </a:lnSpc>
-              <a:spcBef>
-                <a:spcPts val="600"/>
-              </a:spcBef>
-              <a:spcAft>
-                <a:spcPts val="0"/>
-              </a:spcAft>
-              <a:buClr>
-                <a:schemeClr val="dk1"/>
-              </a:buClr>
-              <a:buSzPts val="2000"/>
-              <a:buFont typeface="Barlow Light"/>
-              <a:buChar char="▹"/>
-              <a:defRPr sz="2000" b="0" i="0" u="none" strike="noStrike" cap="none">
-                <a:solidFill>
-                  <a:schemeClr val="dk1"/>
-                </a:solidFill>
-                <a:latin typeface="Barlow Light"/>
-                <a:ea typeface="Barlow Light"/>
-                <a:cs typeface="Barlow Light"/>
-                <a:sym typeface="Barlow Light"/>
-              </a:defRPr>
-            </a:lvl9pPr>
-          </a:lstStyle>
-          <a:p>
-            <a:pPr marL="0" indent="0" algn="ctr">
-              <a:buNone/>
-            </a:pPr>
-            <a:r>
-              <a:rPr lang="et-EE" sz="1600" dirty="0" smtClean="0"/>
-              <a:t>Global logistics</a:t>
-            </a:r>
-            <a:endParaRPr lang="en-US" sz="1600" dirty="0"/>
-          </a:p>
-        </p:txBody>
-      </p:sp>
-      <p:sp>
-        <p:nvSpPr>
-          <p:cNvPr id="74" name="Google Shape;857;p19"/>
-          <p:cNvSpPr txBox="1">
-            <a:spLocks/>
-          </p:cNvSpPr>
-          <p:nvPr/>
-        </p:nvSpPr>
-        <p:spPr>
-          <a:xfrm>
-            <a:off x="3793583" y="4283355"/>
-            <a:ext cx="1445510" cy="678195"/>
-          </a:xfrm>
-          <a:prstGeom prst="rect">
-            <a:avLst/>
-          </a:prstGeom>
-          <a:noFill/>
-          <a:ln w="12700">
-            <a:noFill/>
-          </a:ln>
-        </p:spPr>
-        <p:txBody>
-          <a:bodyPr spcFirstLastPara="1" wrap="square" lIns="0" tIns="0" rIns="0" bIns="0" anchor="t" anchorCtr="0">
-            <a:noAutofit/>
-          </a:bodyPr>
-          <a:lstStyle>
-            <a:defPPr marR="0" lvl="0" algn="l" rtl="0">
-              <a:lnSpc>
-                <a:spcPct val="100000"/>
-              </a:lnSpc>
-              <a:spcBef>
-                <a:spcPts val="0"/>
-              </a:spcBef>
-              <a:spcAft>
-                <a:spcPts val="0"/>
-              </a:spcAft>
-            </a:defPPr>
-            <a:lvl1pPr marL="457200" marR="0" lvl="0" indent="-342900" algn="l" rtl="0">
-              <a:lnSpc>
-                <a:spcPct val="110000"/>
-              </a:lnSpc>
-              <a:spcBef>
-                <a:spcPts val="600"/>
-              </a:spcBef>
-              <a:spcAft>
-                <a:spcPts val="0"/>
-              </a:spcAft>
-              <a:buClr>
-                <a:schemeClr val="accent1"/>
-              </a:buClr>
-              <a:buSzPts val="1800"/>
-              <a:buFont typeface="Barlow Light"/>
-              <a:buChar char="▸"/>
-              <a:defRPr sz="2000" b="0" i="0" u="none" strike="noStrike" cap="none">
-                <a:solidFill>
-                  <a:schemeClr val="dk1"/>
-                </a:solidFill>
-                <a:latin typeface="Barlow Light"/>
-                <a:ea typeface="Barlow Light"/>
-                <a:cs typeface="Barlow Light"/>
-                <a:sym typeface="Barlow Light"/>
-              </a:defRPr>
-            </a:lvl1pPr>
-            <a:lvl2pPr marL="914400" marR="0" lvl="1" indent="-342900" algn="l" rtl="0">
-              <a:lnSpc>
-                <a:spcPct val="110000"/>
-              </a:lnSpc>
-              <a:spcBef>
-                <a:spcPts val="600"/>
-              </a:spcBef>
-              <a:spcAft>
-                <a:spcPts val="0"/>
-              </a:spcAft>
-              <a:buClr>
-                <a:schemeClr val="accent1"/>
-              </a:buClr>
-              <a:buSzPts val="1800"/>
-              <a:buFont typeface="Barlow Light"/>
-              <a:buChar char="▹"/>
-              <a:defRPr sz="2000" b="0" i="0" u="none" strike="noStrike" cap="none">
-                <a:solidFill>
-                  <a:schemeClr val="dk1"/>
-                </a:solidFill>
-                <a:latin typeface="Barlow Light"/>
-                <a:ea typeface="Barlow Light"/>
-                <a:cs typeface="Barlow Light"/>
-                <a:sym typeface="Barlow Light"/>
-              </a:defRPr>
-            </a:lvl2pPr>
-            <a:lvl3pPr marL="1371600" marR="0" lvl="2" indent="-342900" algn="l" rtl="0">
-              <a:lnSpc>
-                <a:spcPct val="110000"/>
-              </a:lnSpc>
-              <a:spcBef>
-                <a:spcPts val="600"/>
-              </a:spcBef>
-              <a:spcAft>
-                <a:spcPts val="0"/>
-              </a:spcAft>
-              <a:buClr>
-                <a:schemeClr val="accent1"/>
-              </a:buClr>
-              <a:buSzPts val="1800"/>
-              <a:buFont typeface="Barlow Light"/>
-              <a:buChar char="▹"/>
-              <a:defRPr sz="2000" b="0" i="0" u="none" strike="noStrike" cap="none">
-                <a:solidFill>
-                  <a:schemeClr val="dk1"/>
-                </a:solidFill>
-                <a:latin typeface="Barlow Light"/>
-                <a:ea typeface="Barlow Light"/>
-                <a:cs typeface="Barlow Light"/>
-                <a:sym typeface="Barlow Light"/>
-              </a:defRPr>
-            </a:lvl3pPr>
-            <a:lvl4pPr marL="1828800" marR="0" lvl="3" indent="-355600" algn="l" rtl="0">
-              <a:lnSpc>
-                <a:spcPct val="110000"/>
-              </a:lnSpc>
-              <a:spcBef>
-                <a:spcPts val="600"/>
-              </a:spcBef>
-              <a:spcAft>
-                <a:spcPts val="0"/>
-              </a:spcAft>
-              <a:buClr>
-                <a:schemeClr val="dk1"/>
-              </a:buClr>
-              <a:buSzPts val="2000"/>
-              <a:buFont typeface="Barlow Light"/>
-              <a:buChar char="▹"/>
-              <a:defRPr sz="2000" b="0" i="0" u="none" strike="noStrike" cap="none">
-                <a:solidFill>
-                  <a:schemeClr val="dk1"/>
-                </a:solidFill>
-                <a:latin typeface="Barlow Light"/>
-                <a:ea typeface="Barlow Light"/>
-                <a:cs typeface="Barlow Light"/>
-                <a:sym typeface="Barlow Light"/>
-              </a:defRPr>
-            </a:lvl4pPr>
-            <a:lvl5pPr marL="2286000" marR="0" lvl="4" indent="-355600" algn="l" rtl="0">
-              <a:lnSpc>
-                <a:spcPct val="110000"/>
-              </a:lnSpc>
-              <a:spcBef>
-                <a:spcPts val="600"/>
-              </a:spcBef>
-              <a:spcAft>
-                <a:spcPts val="0"/>
-              </a:spcAft>
-              <a:buClr>
-                <a:schemeClr val="dk1"/>
-              </a:buClr>
-              <a:buSzPts val="2000"/>
-              <a:buFont typeface="Barlow Light"/>
-              <a:buChar char="▹"/>
-              <a:defRPr sz="2000" b="0" i="0" u="none" strike="noStrike" cap="none">
-                <a:solidFill>
-                  <a:schemeClr val="dk1"/>
-                </a:solidFill>
-                <a:latin typeface="Barlow Light"/>
-                <a:ea typeface="Barlow Light"/>
-                <a:cs typeface="Barlow Light"/>
-                <a:sym typeface="Barlow Light"/>
-              </a:defRPr>
-            </a:lvl5pPr>
-            <a:lvl6pPr marL="2743200" marR="0" lvl="5" indent="-355600" algn="l" rtl="0">
-              <a:lnSpc>
-                <a:spcPct val="110000"/>
-              </a:lnSpc>
-              <a:spcBef>
-                <a:spcPts val="600"/>
-              </a:spcBef>
-              <a:spcAft>
-                <a:spcPts val="0"/>
-              </a:spcAft>
-              <a:buClr>
-                <a:schemeClr val="dk1"/>
-              </a:buClr>
-              <a:buSzPts val="2000"/>
-              <a:buFont typeface="Barlow Light"/>
-              <a:buChar char="▹"/>
-              <a:defRPr sz="2000" b="0" i="0" u="none" strike="noStrike" cap="none">
-                <a:solidFill>
-                  <a:schemeClr val="dk1"/>
-                </a:solidFill>
-                <a:latin typeface="Barlow Light"/>
-                <a:ea typeface="Barlow Light"/>
-                <a:cs typeface="Barlow Light"/>
-                <a:sym typeface="Barlow Light"/>
-              </a:defRPr>
-            </a:lvl6pPr>
-            <a:lvl7pPr marL="3200400" marR="0" lvl="6" indent="-355600" algn="l" rtl="0">
-              <a:lnSpc>
-                <a:spcPct val="110000"/>
-              </a:lnSpc>
-              <a:spcBef>
-                <a:spcPts val="600"/>
-              </a:spcBef>
-              <a:spcAft>
-                <a:spcPts val="0"/>
-              </a:spcAft>
-              <a:buClr>
-                <a:schemeClr val="dk1"/>
-              </a:buClr>
-              <a:buSzPts val="2000"/>
-              <a:buFont typeface="Barlow Light"/>
-              <a:buChar char="▹"/>
-              <a:defRPr sz="2000" b="0" i="0" u="none" strike="noStrike" cap="none">
-                <a:solidFill>
-                  <a:schemeClr val="dk1"/>
-                </a:solidFill>
-                <a:latin typeface="Barlow Light"/>
-                <a:ea typeface="Barlow Light"/>
-                <a:cs typeface="Barlow Light"/>
-                <a:sym typeface="Barlow Light"/>
-              </a:defRPr>
-            </a:lvl7pPr>
-            <a:lvl8pPr marL="3657600" marR="0" lvl="7" indent="-355600" algn="l" rtl="0">
-              <a:lnSpc>
-                <a:spcPct val="110000"/>
-              </a:lnSpc>
-              <a:spcBef>
-                <a:spcPts val="600"/>
-              </a:spcBef>
-              <a:spcAft>
-                <a:spcPts val="0"/>
-              </a:spcAft>
-              <a:buClr>
-                <a:schemeClr val="dk1"/>
-              </a:buClr>
-              <a:buSzPts val="2000"/>
-              <a:buFont typeface="Barlow Light"/>
-              <a:buChar char="▹"/>
-              <a:defRPr sz="2000" b="0" i="0" u="none" strike="noStrike" cap="none">
-                <a:solidFill>
-                  <a:schemeClr val="dk1"/>
-                </a:solidFill>
-                <a:latin typeface="Barlow Light"/>
-                <a:ea typeface="Barlow Light"/>
-                <a:cs typeface="Barlow Light"/>
-                <a:sym typeface="Barlow Light"/>
-              </a:defRPr>
-            </a:lvl8pPr>
-            <a:lvl9pPr marL="4114800" marR="0" lvl="8" indent="-355600" algn="l" rtl="0">
-              <a:lnSpc>
-                <a:spcPct val="110000"/>
-              </a:lnSpc>
-              <a:spcBef>
-                <a:spcPts val="600"/>
-              </a:spcBef>
-              <a:spcAft>
-                <a:spcPts val="0"/>
-              </a:spcAft>
-              <a:buClr>
-                <a:schemeClr val="dk1"/>
-              </a:buClr>
-              <a:buSzPts val="2000"/>
-              <a:buFont typeface="Barlow Light"/>
-              <a:buChar char="▹"/>
-              <a:defRPr sz="2000" b="0" i="0" u="none" strike="noStrike" cap="none">
-                <a:solidFill>
-                  <a:schemeClr val="dk1"/>
-                </a:solidFill>
-                <a:latin typeface="Barlow Light"/>
-                <a:ea typeface="Barlow Light"/>
-                <a:cs typeface="Barlow Light"/>
-                <a:sym typeface="Barlow Light"/>
-              </a:defRPr>
-            </a:lvl9pPr>
-          </a:lstStyle>
-          <a:p>
-            <a:pPr marL="0" indent="0" algn="ctr">
-              <a:buNone/>
-            </a:pPr>
-            <a:r>
-              <a:rPr lang="et-EE" sz="1600" dirty="0" smtClean="0"/>
-              <a:t>Communication</a:t>
+              <a:rPr lang="en-US" sz="1600" dirty="0" smtClean="0"/>
+              <a:t>CRM</a:t>
             </a:r>
             <a:endParaRPr lang="en-US" sz="1600" dirty="0"/>
           </a:p>
@@ -34289,7 +33119,7 @@
           <p:cNvPr id="51" name="Rectangle 50">
             <a:extLst>
               <a:ext uri="{FF2B5EF4-FFF2-40B4-BE49-F238E27FC236}">
-                <a16:creationId xmlns="" xmlns:a16="http://schemas.microsoft.com/office/drawing/2014/main" id="{C820B1CE-1074-44C3-81AF-B93E081EDCAB}"/>
+                <a16:creationId xmlns:a16="http://schemas.microsoft.com/office/drawing/2014/main" xmlns="" id="{C820B1CE-1074-44C3-81AF-B93E081EDCAB}"/>
               </a:ext>
             </a:extLst>
           </p:cNvPr>
@@ -34363,7 +33193,7 @@
           <p:cNvPr id="54" name="Rectangle 53">
             <a:extLst>
               <a:ext uri="{FF2B5EF4-FFF2-40B4-BE49-F238E27FC236}">
-                <a16:creationId xmlns="" xmlns:a16="http://schemas.microsoft.com/office/drawing/2014/main" id="{C820B1CE-1074-44C3-81AF-B93E081EDCAB}"/>
+                <a16:creationId xmlns:a16="http://schemas.microsoft.com/office/drawing/2014/main" xmlns="" id="{C820B1CE-1074-44C3-81AF-B93E081EDCAB}"/>
               </a:ext>
             </a:extLst>
           </p:cNvPr>
@@ -34437,7 +33267,7 @@
           <p:cNvPr id="55" name="Rectangle 54">
             <a:extLst>
               <a:ext uri="{FF2B5EF4-FFF2-40B4-BE49-F238E27FC236}">
-                <a16:creationId xmlns="" xmlns:a16="http://schemas.microsoft.com/office/drawing/2014/main" id="{C820B1CE-1074-44C3-81AF-B93E081EDCAB}"/>
+                <a16:creationId xmlns:a16="http://schemas.microsoft.com/office/drawing/2014/main" xmlns="" id="{C820B1CE-1074-44C3-81AF-B93E081EDCAB}"/>
               </a:ext>
             </a:extLst>
           </p:cNvPr>
@@ -34511,7 +33341,7 @@
           <p:cNvPr id="56" name="Rectangle 55">
             <a:extLst>
               <a:ext uri="{FF2B5EF4-FFF2-40B4-BE49-F238E27FC236}">
-                <a16:creationId xmlns="" xmlns:a16="http://schemas.microsoft.com/office/drawing/2014/main" id="{C820B1CE-1074-44C3-81AF-B93E081EDCAB}"/>
+                <a16:creationId xmlns:a16="http://schemas.microsoft.com/office/drawing/2014/main" xmlns="" id="{C820B1CE-1074-44C3-81AF-B93E081EDCAB}"/>
               </a:ext>
             </a:extLst>
           </p:cNvPr>
@@ -34585,7 +33415,7 @@
           <p:cNvPr id="58" name="Rectangle 57">
             <a:extLst>
               <a:ext uri="{FF2B5EF4-FFF2-40B4-BE49-F238E27FC236}">
-                <a16:creationId xmlns="" xmlns:a16="http://schemas.microsoft.com/office/drawing/2014/main" id="{C820B1CE-1074-44C3-81AF-B93E081EDCAB}"/>
+                <a16:creationId xmlns:a16="http://schemas.microsoft.com/office/drawing/2014/main" xmlns="" id="{C820B1CE-1074-44C3-81AF-B93E081EDCAB}"/>
               </a:ext>
             </a:extLst>
           </p:cNvPr>
@@ -34659,7 +33489,7 @@
           <p:cNvPr id="61" name="Rectangle 60">
             <a:extLst>
               <a:ext uri="{FF2B5EF4-FFF2-40B4-BE49-F238E27FC236}">
-                <a16:creationId xmlns="" xmlns:a16="http://schemas.microsoft.com/office/drawing/2014/main" id="{C820B1CE-1074-44C3-81AF-B93E081EDCAB}"/>
+                <a16:creationId xmlns:a16="http://schemas.microsoft.com/office/drawing/2014/main" xmlns="" id="{C820B1CE-1074-44C3-81AF-B93E081EDCAB}"/>
               </a:ext>
             </a:extLst>
           </p:cNvPr>
@@ -34733,7 +33563,7 @@
           <p:cNvPr id="62" name="Rectangle 61">
             <a:extLst>
               <a:ext uri="{FF2B5EF4-FFF2-40B4-BE49-F238E27FC236}">
-                <a16:creationId xmlns="" xmlns:a16="http://schemas.microsoft.com/office/drawing/2014/main" id="{C820B1CE-1074-44C3-81AF-B93E081EDCAB}"/>
+                <a16:creationId xmlns:a16="http://schemas.microsoft.com/office/drawing/2014/main" xmlns="" id="{C820B1CE-1074-44C3-81AF-B93E081EDCAB}"/>
               </a:ext>
             </a:extLst>
           </p:cNvPr>
@@ -34807,7 +33637,7 @@
           <p:cNvPr id="63" name="Rectangle 62">
             <a:extLst>
               <a:ext uri="{FF2B5EF4-FFF2-40B4-BE49-F238E27FC236}">
-                <a16:creationId xmlns="" xmlns:a16="http://schemas.microsoft.com/office/drawing/2014/main" id="{C820B1CE-1074-44C3-81AF-B93E081EDCAB}"/>
+                <a16:creationId xmlns:a16="http://schemas.microsoft.com/office/drawing/2014/main" xmlns="" id="{C820B1CE-1074-44C3-81AF-B93E081EDCAB}"/>
               </a:ext>
             </a:extLst>
           </p:cNvPr>
@@ -34881,7 +33711,7 @@
           <p:cNvPr id="64" name="Straight Arrow Connector 63">
             <a:extLst>
               <a:ext uri="{FF2B5EF4-FFF2-40B4-BE49-F238E27FC236}">
-                <a16:creationId xmlns:lc="http://schemas.openxmlformats.org/drawingml/2006/lockedCanvas" xmlns:a16="http://schemas.microsoft.com/office/drawing/2014/main" xmlns="" id="{8EFAA25A-D8D6-420E-B8D9-6181A6D61CA3}"/>
+                <a16:creationId xmlns="" xmlns:a16="http://schemas.microsoft.com/office/drawing/2014/main" xmlns:lc="http://schemas.openxmlformats.org/drawingml/2006/lockedCanvas" id="{8EFAA25A-D8D6-420E-B8D9-6181A6D61CA3}"/>
               </a:ext>
             </a:extLst>
           </p:cNvPr>
@@ -34926,7 +33756,7 @@
           <p:cNvPr id="67" name="Straight Arrow Connector 66">
             <a:extLst>
               <a:ext uri="{FF2B5EF4-FFF2-40B4-BE49-F238E27FC236}">
-                <a16:creationId xmlns:lc="http://schemas.openxmlformats.org/drawingml/2006/lockedCanvas" xmlns:a16="http://schemas.microsoft.com/office/drawing/2014/main" xmlns="" id="{8EFAA25A-D8D6-420E-B8D9-6181A6D61CA3}"/>
+                <a16:creationId xmlns="" xmlns:a16="http://schemas.microsoft.com/office/drawing/2014/main" xmlns:lc="http://schemas.openxmlformats.org/drawingml/2006/lockedCanvas" id="{8EFAA25A-D8D6-420E-B8D9-6181A6D61CA3}"/>
               </a:ext>
             </a:extLst>
           </p:cNvPr>
@@ -34971,7 +33801,7 @@
           <p:cNvPr id="68" name="Straight Arrow Connector 67">
             <a:extLst>
               <a:ext uri="{FF2B5EF4-FFF2-40B4-BE49-F238E27FC236}">
-                <a16:creationId xmlns:lc="http://schemas.openxmlformats.org/drawingml/2006/lockedCanvas" xmlns:a16="http://schemas.microsoft.com/office/drawing/2014/main" xmlns="" id="{8EFAA25A-D8D6-420E-B8D9-6181A6D61CA3}"/>
+                <a16:creationId xmlns="" xmlns:a16="http://schemas.microsoft.com/office/drawing/2014/main" xmlns:lc="http://schemas.openxmlformats.org/drawingml/2006/lockedCanvas" id="{8EFAA25A-D8D6-420E-B8D9-6181A6D61CA3}"/>
               </a:ext>
             </a:extLst>
           </p:cNvPr>
@@ -38309,12 +37139,6 @@
               </a:rPr>
               <a:t>Source</a:t>
             </a:r>
-            <a:endParaRPr lang="et-EE" b="1" dirty="0" smtClean="0">
-              <a:solidFill>
-                <a:srgbClr val="01224B"/>
-              </a:solidFill>
-              <a:latin typeface="Raleway SemiBold" charset="0"/>
-            </a:endParaRPr>
           </a:p>
           <a:p>
             <a:pPr algn="ctr">
@@ -41996,7 +40820,7 @@
         </p:nvSpPr>
         <p:spPr>
           <a:xfrm>
-            <a:off x="3481536" y="2729436"/>
+            <a:off x="3265512" y="2767260"/>
             <a:ext cx="2314600" cy="404708"/>
           </a:xfrm>
           <a:prstGeom prst="rect">
@@ -45236,11 +44060,7 @@
             </a:pPr>
             <a:r>
               <a:rPr lang="et-EE" sz="1600" dirty="0" smtClean="0"/>
-              <a:t>Data </a:t>
-            </a:r>
-            <a:r>
-              <a:rPr lang="et-EE" sz="1600" dirty="0" smtClean="0"/>
-              <a:t>Analytics</a:t>
+              <a:t>Data Analytics</a:t>
             </a:r>
             <a:endParaRPr lang="en-US" sz="1600" dirty="0"/>
           </a:p>
@@ -46886,6 +45706,252 @@
           </a:p>
         </p:txBody>
       </p:sp>
+      <p:pic>
+        <p:nvPicPr>
+          <p:cNvPr id="46" name="Picture 2" descr="https://lh5.googleusercontent.com/UWCdSqpGBb4sCgcHH1l9pO9NhKW8XNX__bkLmSGsRq2bTVXeA4pdUEfRU-vmppuEW9YhPcAopiFlEzWpHbhTw7BF-4EeYLAkC_WPQYvF8Yhlks3aUYy5OYZpHuhOHWJq564vDzGsziE"/>
+          <p:cNvPicPr>
+            <a:picLocks noChangeAspect="1" noChangeArrowheads="1"/>
+          </p:cNvPicPr>
+          <p:nvPr/>
+        </p:nvPicPr>
+        <p:blipFill>
+          <a:blip r:embed="rId3">
+            <a:extLst>
+              <a:ext uri="{28A0092B-C50C-407E-A947-70E740481C1C}">
+                <a14:useLocalDpi xmlns:a14="http://schemas.microsoft.com/office/drawing/2010/main" val="0"/>
+              </a:ext>
+            </a:extLst>
+          </a:blip>
+          <a:srcRect/>
+          <a:stretch>
+            <a:fillRect/>
+          </a:stretch>
+        </p:blipFill>
+        <p:spPr bwMode="auto">
+          <a:xfrm>
+            <a:off x="4891902" y="2352085"/>
+            <a:ext cx="398050" cy="398050"/>
+          </a:xfrm>
+          <a:prstGeom prst="rect">
+            <a:avLst/>
+          </a:prstGeom>
+          <a:noFill/>
+          <a:extLst>
+            <a:ext uri="{909E8E84-426E-40DD-AFC4-6F175D3DCCD1}">
+              <a14:hiddenFill xmlns:a14="http://schemas.microsoft.com/office/drawing/2010/main">
+                <a:solidFill>
+                  <a:srgbClr val="FFFFFF"/>
+                </a:solidFill>
+              </a14:hiddenFill>
+            </a:ext>
+          </a:extLst>
+        </p:spPr>
+      </p:pic>
+      <p:pic>
+        <p:nvPicPr>
+          <p:cNvPr id="2050" name="Picture 2" descr="https://lh6.googleusercontent.com/s2sIlCBrQmOUIvRV0D9xIobYepMMrwLJ-yomUEAAuxN3Zy3pNR2ZddOqY7ewfo1528zvD-xakzYWd9EhHnh7Dk4dngjv88q_2EYq64t4feuzQ9hsG7x02d63HeMXnymCu3a-OwNX1HU"/>
+          <p:cNvPicPr>
+            <a:picLocks noChangeAspect="1" noChangeArrowheads="1"/>
+          </p:cNvPicPr>
+          <p:nvPr/>
+        </p:nvPicPr>
+        <p:blipFill>
+          <a:blip r:embed="rId4">
+            <a:extLst>
+              <a:ext uri="{28A0092B-C50C-407E-A947-70E740481C1C}">
+                <a14:useLocalDpi xmlns:a14="http://schemas.microsoft.com/office/drawing/2010/main" val="0"/>
+              </a:ext>
+            </a:extLst>
+          </a:blip>
+          <a:srcRect/>
+          <a:stretch>
+            <a:fillRect/>
+          </a:stretch>
+        </p:blipFill>
+        <p:spPr bwMode="auto">
+          <a:xfrm>
+            <a:off x="899592" y="2352084"/>
+            <a:ext cx="435689" cy="435689"/>
+          </a:xfrm>
+          <a:prstGeom prst="rect">
+            <a:avLst/>
+          </a:prstGeom>
+          <a:noFill/>
+          <a:extLst>
+            <a:ext uri="{909E8E84-426E-40DD-AFC4-6F175D3DCCD1}">
+              <a14:hiddenFill xmlns:a14="http://schemas.microsoft.com/office/drawing/2010/main">
+                <a:solidFill>
+                  <a:srgbClr val="FFFFFF"/>
+                </a:solidFill>
+              </a14:hiddenFill>
+            </a:ext>
+          </a:extLst>
+        </p:spPr>
+      </p:pic>
+      <p:pic>
+        <p:nvPicPr>
+          <p:cNvPr id="2052" name="Picture 4" descr="https://lh5.googleusercontent.com/SIWjcRLC_EGb14EbXExkLmV9oQrnRsNPABO01e6btouXBHmhmWJxyq3jLNU1Wo8SXC17-GiOlIaBGZf3N0TeMNVyZV_1LSnFc0E7JcV0Ntun_15T3fyhIOdrRIBKdNt1YXnXPGqpJQg"/>
+          <p:cNvPicPr>
+            <a:picLocks noChangeAspect="1" noChangeArrowheads="1"/>
+          </p:cNvPicPr>
+          <p:nvPr/>
+        </p:nvPicPr>
+        <p:blipFill>
+          <a:blip r:embed="rId5">
+            <a:extLst>
+              <a:ext uri="{28A0092B-C50C-407E-A947-70E740481C1C}">
+                <a14:useLocalDpi xmlns:a14="http://schemas.microsoft.com/office/drawing/2010/main" val="0"/>
+              </a:ext>
+            </a:extLst>
+          </a:blip>
+          <a:srcRect/>
+          <a:stretch>
+            <a:fillRect/>
+          </a:stretch>
+        </p:blipFill>
+        <p:spPr bwMode="auto">
+          <a:xfrm>
+            <a:off x="2206588" y="2283718"/>
+            <a:ext cx="502889" cy="502889"/>
+          </a:xfrm>
+          <a:prstGeom prst="rect">
+            <a:avLst/>
+          </a:prstGeom>
+          <a:noFill/>
+          <a:extLst>
+            <a:ext uri="{909E8E84-426E-40DD-AFC4-6F175D3DCCD1}">
+              <a14:hiddenFill xmlns:a14="http://schemas.microsoft.com/office/drawing/2010/main">
+                <a:solidFill>
+                  <a:srgbClr val="FFFFFF"/>
+                </a:solidFill>
+              </a14:hiddenFill>
+            </a:ext>
+          </a:extLst>
+        </p:spPr>
+      </p:pic>
+      <p:pic>
+        <p:nvPicPr>
+          <p:cNvPr id="2054" name="Picture 6" descr="https://lh6.googleusercontent.com/VqwzpF-rJaxNbcse0TUq-YNEoHLMACIB2mW76TrZ7o6lTKTGejNyhsRumLNfaxALnlLs9UAp7_3Fx7xoQzThSdNsCzKiRl8ITo-_5pmzmdIVvQQbZLgAFibyoy2b_RC_nb2YcLvzLNQ"/>
+          <p:cNvPicPr>
+            <a:picLocks noChangeAspect="1" noChangeArrowheads="1"/>
+          </p:cNvPicPr>
+          <p:nvPr/>
+        </p:nvPicPr>
+        <p:blipFill>
+          <a:blip r:embed="rId6">
+            <a:extLst>
+              <a:ext uri="{28A0092B-C50C-407E-A947-70E740481C1C}">
+                <a14:useLocalDpi xmlns:a14="http://schemas.microsoft.com/office/drawing/2010/main" val="0"/>
+              </a:ext>
+            </a:extLst>
+          </a:blip>
+          <a:srcRect/>
+          <a:stretch>
+            <a:fillRect/>
+          </a:stretch>
+        </p:blipFill>
+        <p:spPr bwMode="auto">
+          <a:xfrm>
+            <a:off x="3539925" y="2322414"/>
+            <a:ext cx="486110" cy="486110"/>
+          </a:xfrm>
+          <a:prstGeom prst="rect">
+            <a:avLst/>
+          </a:prstGeom>
+          <a:noFill/>
+          <a:extLst>
+            <a:ext uri="{909E8E84-426E-40DD-AFC4-6F175D3DCCD1}">
+              <a14:hiddenFill xmlns:a14="http://schemas.microsoft.com/office/drawing/2010/main">
+                <a:solidFill>
+                  <a:srgbClr val="FFFFFF"/>
+                </a:solidFill>
+              </a14:hiddenFill>
+            </a:ext>
+          </a:extLst>
+        </p:spPr>
+      </p:pic>
+      <p:pic>
+        <p:nvPicPr>
+          <p:cNvPr id="2056" name="Picture 8" descr="https://lh5.googleusercontent.com/i8ZQ3peT9vPCDdHGssqLt0ekNmHH4fgT-2TYPS8w7fuG2yvKoxFbd6PgOrE87qjO5Pr_jp2ID6Kknu0bK7ZOWJfjFqMIEuEGvAfTVV7dRUMifPbDLs0oK3ai0--DhXkNIDpOpYMeY3M"/>
+          <p:cNvPicPr>
+            <a:picLocks noChangeAspect="1" noChangeArrowheads="1"/>
+          </p:cNvPicPr>
+          <p:nvPr/>
+        </p:nvPicPr>
+        <p:blipFill>
+          <a:blip r:embed="rId7">
+            <a:extLst>
+              <a:ext uri="{28A0092B-C50C-407E-A947-70E740481C1C}">
+                <a14:useLocalDpi xmlns:a14="http://schemas.microsoft.com/office/drawing/2010/main" val="0"/>
+              </a:ext>
+            </a:extLst>
+          </a:blip>
+          <a:srcRect/>
+          <a:stretch>
+            <a:fillRect/>
+          </a:stretch>
+        </p:blipFill>
+        <p:spPr bwMode="auto">
+          <a:xfrm>
+            <a:off x="6200082" y="2315944"/>
+            <a:ext cx="465584" cy="465584"/>
+          </a:xfrm>
+          <a:prstGeom prst="rect">
+            <a:avLst/>
+          </a:prstGeom>
+          <a:noFill/>
+          <a:extLst>
+            <a:ext uri="{909E8E84-426E-40DD-AFC4-6F175D3DCCD1}">
+              <a14:hiddenFill xmlns:a14="http://schemas.microsoft.com/office/drawing/2010/main">
+                <a:solidFill>
+                  <a:srgbClr val="FFFFFF"/>
+                </a:solidFill>
+              </a14:hiddenFill>
+            </a:ext>
+          </a:extLst>
+        </p:spPr>
+      </p:pic>
+      <p:pic>
+        <p:nvPicPr>
+          <p:cNvPr id="2058" name="Picture 10" descr="https://lh4.googleusercontent.com/PiK6wN7n-YaAbvgg9YMKJbhb6gKZ6sPtAdPZlsGA8VeY9nHT_IZLlsvaZ1v5Ytk902Y_A32qSYdIFX79i_aDzNJu1nYh4wXseJFrH12D8-JSRA05JtlnWhpmLtrCNMCTyn4yrb7jYpQ"/>
+          <p:cNvPicPr>
+            <a:picLocks noChangeAspect="1" noChangeArrowheads="1"/>
+          </p:cNvPicPr>
+          <p:nvPr/>
+        </p:nvPicPr>
+        <p:blipFill>
+          <a:blip r:embed="rId8">
+            <a:extLst>
+              <a:ext uri="{28A0092B-C50C-407E-A947-70E740481C1C}">
+                <a14:useLocalDpi xmlns:a14="http://schemas.microsoft.com/office/drawing/2010/main" val="0"/>
+              </a:ext>
+            </a:extLst>
+          </a:blip>
+          <a:srcRect/>
+          <a:stretch>
+            <a:fillRect/>
+          </a:stretch>
+        </p:blipFill>
+        <p:spPr bwMode="auto">
+          <a:xfrm>
+            <a:off x="7530583" y="2321497"/>
+            <a:ext cx="454478" cy="454478"/>
+          </a:xfrm>
+          <a:prstGeom prst="rect">
+            <a:avLst/>
+          </a:prstGeom>
+          <a:noFill/>
+          <a:extLst>
+            <a:ext uri="{909E8E84-426E-40DD-AFC4-6F175D3DCCD1}">
+              <a14:hiddenFill xmlns:a14="http://schemas.microsoft.com/office/drawing/2010/main">
+                <a:solidFill>
+                  <a:srgbClr val="FFFFFF"/>
+                </a:solidFill>
+              </a14:hiddenFill>
+            </a:ext>
+          </a:extLst>
+        </p:spPr>
+      </p:pic>
     </p:spTree>
     <p:extLst>
       <p:ext uri="{BB962C8B-B14F-4D97-AF65-F5344CB8AC3E}">
@@ -51467,11 +50533,7 @@
             </a:pPr>
             <a:r>
               <a:rPr lang="et-EE" sz="1600" dirty="0" smtClean="0"/>
-              <a:t>Customer s</a:t>
-            </a:r>
-            <a:r>
-              <a:rPr lang="et-EE" sz="1600" dirty="0" smtClean="0"/>
-              <a:t>ervice</a:t>
+              <a:t>Customer service</a:t>
             </a:r>
             <a:endParaRPr lang="en-US" sz="1600" dirty="0"/>
           </a:p>
@@ -51761,6 +50823,293 @@
           </a:p>
         </p:txBody>
       </p:sp>
+      <p:pic>
+        <p:nvPicPr>
+          <p:cNvPr id="1026" name="Picture 2" descr="https://lh5.googleusercontent.com/UWCdSqpGBb4sCgcHH1l9pO9NhKW8XNX__bkLmSGsRq2bTVXeA4pdUEfRU-vmppuEW9YhPcAopiFlEzWpHbhTw7BF-4EeYLAkC_WPQYvF8Yhlks3aUYy5OYZpHuhOHWJq564vDzGsziE"/>
+          <p:cNvPicPr>
+            <a:picLocks noChangeAspect="1" noChangeArrowheads="1"/>
+          </p:cNvPicPr>
+          <p:nvPr/>
+        </p:nvPicPr>
+        <p:blipFill>
+          <a:blip r:embed="rId3">
+            <a:extLst>
+              <a:ext uri="{28A0092B-C50C-407E-A947-70E740481C1C}">
+                <a14:useLocalDpi xmlns:a14="http://schemas.microsoft.com/office/drawing/2010/main" val="0"/>
+              </a:ext>
+            </a:extLst>
+          </a:blip>
+          <a:srcRect/>
+          <a:stretch>
+            <a:fillRect/>
+          </a:stretch>
+        </p:blipFill>
+        <p:spPr bwMode="auto">
+          <a:xfrm>
+            <a:off x="467073" y="2546867"/>
+            <a:ext cx="398050" cy="398050"/>
+          </a:xfrm>
+          <a:prstGeom prst="rect">
+            <a:avLst/>
+          </a:prstGeom>
+          <a:noFill/>
+          <a:extLst>
+            <a:ext uri="{909E8E84-426E-40DD-AFC4-6F175D3DCCD1}">
+              <a14:hiddenFill xmlns:a14="http://schemas.microsoft.com/office/drawing/2010/main">
+                <a:solidFill>
+                  <a:srgbClr val="FFFFFF"/>
+                </a:solidFill>
+              </a14:hiddenFill>
+            </a:ext>
+          </a:extLst>
+        </p:spPr>
+      </p:pic>
+      <p:pic>
+        <p:nvPicPr>
+          <p:cNvPr id="1030" name="Picture 6" descr="https://lh6.googleusercontent.com/1eq-4VbObea9zfxkMYOs97hCPHHymDbVr8dp9zChJM0ESfv3jPLRVB2GvWi5OMgth9OudKLDLmS9rCgFPP7fzhO_OicDx7ky8T_8e2Y7gZwZ6JhuqLU6q1B56Ccr8oOINyrXp_TkwXU"/>
+          <p:cNvPicPr>
+            <a:picLocks noChangeAspect="1" noChangeArrowheads="1"/>
+          </p:cNvPicPr>
+          <p:nvPr/>
+        </p:nvPicPr>
+        <p:blipFill>
+          <a:blip r:embed="rId4">
+            <a:extLst>
+              <a:ext uri="{28A0092B-C50C-407E-A947-70E740481C1C}">
+                <a14:useLocalDpi xmlns:a14="http://schemas.microsoft.com/office/drawing/2010/main" val="0"/>
+              </a:ext>
+            </a:extLst>
+          </a:blip>
+          <a:srcRect/>
+          <a:stretch>
+            <a:fillRect/>
+          </a:stretch>
+        </p:blipFill>
+        <p:spPr bwMode="auto">
+          <a:xfrm>
+            <a:off x="4337221" y="2519346"/>
+            <a:ext cx="510523" cy="510523"/>
+          </a:xfrm>
+          <a:prstGeom prst="rect">
+            <a:avLst/>
+          </a:prstGeom>
+          <a:noFill/>
+          <a:extLst>
+            <a:ext uri="{909E8E84-426E-40DD-AFC4-6F175D3DCCD1}">
+              <a14:hiddenFill xmlns:a14="http://schemas.microsoft.com/office/drawing/2010/main">
+                <a:solidFill>
+                  <a:srgbClr val="FFFFFF"/>
+                </a:solidFill>
+              </a14:hiddenFill>
+            </a:ext>
+          </a:extLst>
+        </p:spPr>
+      </p:pic>
+      <p:pic>
+        <p:nvPicPr>
+          <p:cNvPr id="1032" name="Picture 8" descr="https://lh4.googleusercontent.com/ZN9XQRQqcb0BnDQmJ_7wQJRnFncyM4rBJyKu93GxdQ4n1qHXpk6wll2L8GvNYjHLlAX-FzrMpnM5vBNYjci3jbJXPOaxur0kIA7nz21ypUDz0jCb8o9CfcvQX6jj2O8GG2qNZspsLAk"/>
+          <p:cNvPicPr>
+            <a:picLocks noChangeAspect="1" noChangeArrowheads="1"/>
+          </p:cNvPicPr>
+          <p:nvPr/>
+        </p:nvPicPr>
+        <p:blipFill>
+          <a:blip r:embed="rId5">
+            <a:extLst>
+              <a:ext uri="{28A0092B-C50C-407E-A947-70E740481C1C}">
+                <a14:useLocalDpi xmlns:a14="http://schemas.microsoft.com/office/drawing/2010/main" val="0"/>
+              </a:ext>
+            </a:extLst>
+          </a:blip>
+          <a:srcRect/>
+          <a:stretch>
+            <a:fillRect/>
+          </a:stretch>
+        </p:blipFill>
+        <p:spPr bwMode="auto">
+          <a:xfrm>
+            <a:off x="5673224" y="2511142"/>
+            <a:ext cx="483249" cy="483249"/>
+          </a:xfrm>
+          <a:prstGeom prst="rect">
+            <a:avLst/>
+          </a:prstGeom>
+          <a:noFill/>
+          <a:extLst>
+            <a:ext uri="{909E8E84-426E-40DD-AFC4-6F175D3DCCD1}">
+              <a14:hiddenFill xmlns:a14="http://schemas.microsoft.com/office/drawing/2010/main">
+                <a:solidFill>
+                  <a:srgbClr val="FFFFFF"/>
+                </a:solidFill>
+              </a14:hiddenFill>
+            </a:ext>
+          </a:extLst>
+        </p:spPr>
+      </p:pic>
+      <p:pic>
+        <p:nvPicPr>
+          <p:cNvPr id="1034" name="Picture 10" descr="https://lh5.googleusercontent.com/3t7VYm5VzYuFYbhVVdDZniFLyeMdm_rYzZU3Mn5Qy01JZZYUCHAa_m3Y97MVz0EH0CpfRR84Q3ua3bsdxLOPmS_gj7jqAyaaOu72KsX-ag6GBiUmPwjg8oB2BlgfpGinOSGFA5uk5R8"/>
+          <p:cNvPicPr>
+            <a:picLocks noChangeAspect="1" noChangeArrowheads="1"/>
+          </p:cNvPicPr>
+          <p:nvPr/>
+        </p:nvPicPr>
+        <p:blipFill>
+          <a:blip r:embed="rId6">
+            <a:extLst>
+              <a:ext uri="{28A0092B-C50C-407E-A947-70E740481C1C}">
+                <a14:useLocalDpi xmlns:a14="http://schemas.microsoft.com/office/drawing/2010/main" val="0"/>
+              </a:ext>
+            </a:extLst>
+          </a:blip>
+          <a:srcRect/>
+          <a:stretch>
+            <a:fillRect/>
+          </a:stretch>
+        </p:blipFill>
+        <p:spPr bwMode="auto">
+          <a:xfrm>
+            <a:off x="1701517" y="2446430"/>
+            <a:ext cx="520825" cy="520825"/>
+          </a:xfrm>
+          <a:prstGeom prst="rect">
+            <a:avLst/>
+          </a:prstGeom>
+          <a:noFill/>
+          <a:extLst>
+            <a:ext uri="{909E8E84-426E-40DD-AFC4-6F175D3DCCD1}">
+              <a14:hiddenFill xmlns:a14="http://schemas.microsoft.com/office/drawing/2010/main">
+                <a:solidFill>
+                  <a:srgbClr val="FFFFFF"/>
+                </a:solidFill>
+              </a14:hiddenFill>
+            </a:ext>
+          </a:extLst>
+        </p:spPr>
+      </p:pic>
+      <p:pic>
+        <p:nvPicPr>
+          <p:cNvPr id="1036" name="Picture 12" descr="https://lh5.googleusercontent.com/GuMLJuRDdfgKjHpSfHx_QOw_3bmcVLGuOCReCSmOHQjgG_8s92cL6bPWO616_bEm5KV-dhQIWRqPvVl25xQtKicRDvs-9TDSCeBh3D6aK0gjch5AUj0NqAyf5IaCiemERQnmTWK6a5c"/>
+          <p:cNvPicPr>
+            <a:picLocks noChangeAspect="1" noChangeArrowheads="1"/>
+          </p:cNvPicPr>
+          <p:nvPr/>
+        </p:nvPicPr>
+        <p:blipFill>
+          <a:blip r:embed="rId7">
+            <a:extLst>
+              <a:ext uri="{28A0092B-C50C-407E-A947-70E740481C1C}">
+                <a14:useLocalDpi xmlns:a14="http://schemas.microsoft.com/office/drawing/2010/main" val="0"/>
+              </a:ext>
+            </a:extLst>
+          </a:blip>
+          <a:srcRect/>
+          <a:stretch>
+            <a:fillRect/>
+          </a:stretch>
+        </p:blipFill>
+        <p:spPr bwMode="auto">
+          <a:xfrm>
+            <a:off x="8295381" y="2511142"/>
+            <a:ext cx="458669" cy="458669"/>
+          </a:xfrm>
+          <a:prstGeom prst="rect">
+            <a:avLst/>
+          </a:prstGeom>
+          <a:noFill/>
+          <a:extLst>
+            <a:ext uri="{909E8E84-426E-40DD-AFC4-6F175D3DCCD1}">
+              <a14:hiddenFill xmlns:a14="http://schemas.microsoft.com/office/drawing/2010/main">
+                <a:solidFill>
+                  <a:srgbClr val="FFFFFF"/>
+                </a:solidFill>
+              </a14:hiddenFill>
+            </a:ext>
+          </a:extLst>
+        </p:spPr>
+      </p:pic>
+      <p:pic>
+        <p:nvPicPr>
+          <p:cNvPr id="1038" name="Picture 14" descr="https://lh6.googleusercontent.com/xgxvqEa5xZc5hctr-s8PkZ8xQn70KiULNi4tpasbpJpiD0j-ON1hgo4kdmC_PlIlwLCUDsY2GmjTcYKs5s52eOlwdl6ks5LhZFbCjp1Fp9NkAY2CEKMM95-_aBgJcknpEvJPrnn8Oik"/>
+          <p:cNvPicPr>
+            <a:picLocks noChangeAspect="1" noChangeArrowheads="1"/>
+          </p:cNvPicPr>
+          <p:nvPr/>
+        </p:nvPicPr>
+        <p:blipFill>
+          <a:blip r:embed="rId8">
+            <a:extLst>
+              <a:ext uri="{28A0092B-C50C-407E-A947-70E740481C1C}">
+                <a14:useLocalDpi xmlns:a14="http://schemas.microsoft.com/office/drawing/2010/main" val="0"/>
+              </a:ext>
+            </a:extLst>
+          </a:blip>
+          <a:srcRect/>
+          <a:stretch>
+            <a:fillRect/>
+          </a:stretch>
+        </p:blipFill>
+        <p:spPr bwMode="auto">
+          <a:xfrm>
+            <a:off x="6968072" y="2479502"/>
+            <a:ext cx="465415" cy="465415"/>
+          </a:xfrm>
+          <a:prstGeom prst="rect">
+            <a:avLst/>
+          </a:prstGeom>
+          <a:noFill/>
+          <a:extLst>
+            <a:ext uri="{909E8E84-426E-40DD-AFC4-6F175D3DCCD1}">
+              <a14:hiddenFill xmlns:a14="http://schemas.microsoft.com/office/drawing/2010/main">
+                <a:solidFill>
+                  <a:srgbClr val="FFFFFF"/>
+                </a:solidFill>
+              </a14:hiddenFill>
+            </a:ext>
+          </a:extLst>
+        </p:spPr>
+      </p:pic>
+      <p:pic>
+        <p:nvPicPr>
+          <p:cNvPr id="1040" name="Picture 16" descr="https://lh4.googleusercontent.com/1_JlTIG-cS7JIs4OjD-imFAXUY7clMzkX3C190AmS8_pLiefYaM8oWMDDgmuNIU1trKBqjmeokrHw27JPFuIsOdYHjEbEDgEugzUMo6zKVfmqO6I3nGfIxSRhEj7Mr6sRLW9LzPf2EM"/>
+          <p:cNvPicPr>
+            <a:picLocks noChangeAspect="1" noChangeArrowheads="1"/>
+          </p:cNvPicPr>
+          <p:nvPr/>
+        </p:nvPicPr>
+        <p:blipFill>
+          <a:blip r:embed="rId9">
+            <a:extLst>
+              <a:ext uri="{28A0092B-C50C-407E-A947-70E740481C1C}">
+                <a14:useLocalDpi xmlns:a14="http://schemas.microsoft.com/office/drawing/2010/main" val="0"/>
+              </a:ext>
+            </a:extLst>
+          </a:blip>
+          <a:srcRect/>
+          <a:stretch>
+            <a:fillRect/>
+          </a:stretch>
+        </p:blipFill>
+        <p:spPr bwMode="auto">
+          <a:xfrm>
+            <a:off x="3059832" y="2549113"/>
+            <a:ext cx="465584" cy="465584"/>
+          </a:xfrm>
+          <a:prstGeom prst="rect">
+            <a:avLst/>
+          </a:prstGeom>
+          <a:noFill/>
+          <a:extLst>
+            <a:ext uri="{909E8E84-426E-40DD-AFC4-6F175D3DCCD1}">
+              <a14:hiddenFill xmlns:a14="http://schemas.microsoft.com/office/drawing/2010/main">
+                <a:solidFill>
+                  <a:srgbClr val="FFFFFF"/>
+                </a:solidFill>
+              </a14:hiddenFill>
+            </a:ext>
+          </a:extLst>
+        </p:spPr>
+      </p:pic>
     </p:spTree>
     <p:extLst>
       <p:ext uri="{BB962C8B-B14F-4D97-AF65-F5344CB8AC3E}">

</xml_diff>

<commit_message>
PO resources refactoring and product management added
</commit_message>
<xml_diff>
--- a/Presentations/Logistics/KNITS-SCM-Services.pptx
+++ b/Presentations/Logistics/KNITS-SCM-Services.pptx
@@ -27,33 +27,33 @@
   <p:notesSz cx="6858000" cy="9144000"/>
   <p:embeddedFontLst>
     <p:embeddedFont>
-      <p:font typeface="Raleway SemiBold" charset="0"/>
+      <p:font typeface="Barlow Light" charset="0"/>
       <p:regular r:id="rId17"/>
       <p:bold r:id="rId18"/>
       <p:italic r:id="rId19"/>
       <p:boldItalic r:id="rId20"/>
     </p:embeddedFont>
     <p:embeddedFont>
-      <p:font typeface="맑은 고딕" pitchFamily="34" charset="-127"/>
+      <p:font typeface="Calibri" pitchFamily="34" charset="0"/>
       <p:regular r:id="rId21"/>
       <p:bold r:id="rId22"/>
+      <p:italic r:id="rId23"/>
+      <p:boldItalic r:id="rId24"/>
     </p:embeddedFont>
     <p:embeddedFont>
-      <p:font typeface="Raleway" charset="0"/>
-      <p:regular r:id="rId23"/>
-      <p:bold r:id="rId24"/>
-      <p:italic r:id="rId25"/>
-      <p:boldItalic r:id="rId26"/>
+      <p:font typeface="맑은 고딕" pitchFamily="34" charset="-127"/>
+      <p:regular r:id="rId25"/>
+      <p:bold r:id="rId26"/>
     </p:embeddedFont>
     <p:embeddedFont>
-      <p:font typeface="Barlow Light" charset="0"/>
+      <p:font typeface="Raleway SemiBold" charset="0"/>
       <p:regular r:id="rId27"/>
       <p:bold r:id="rId28"/>
       <p:italic r:id="rId29"/>
       <p:boldItalic r:id="rId30"/>
     </p:embeddedFont>
     <p:embeddedFont>
-      <p:font typeface="Calibri" pitchFamily="34" charset="0"/>
+      <p:font typeface="Raleway" charset="0"/>
       <p:regular r:id="rId31"/>
       <p:bold r:id="rId32"/>
       <p:italic r:id="rId33"/>
@@ -4480,7 +4480,7 @@
           <p:cNvPicPr>
             <a:picLocks noChangeAspect="1" noChangeArrowheads="1"/>
           </p:cNvPicPr>
-          <p:nvPr userDrawn="1"/>
+          <p:nvPr/>
         </p:nvPicPr>
         <p:blipFill>
           <a:blip r:embed="rId6">
@@ -24572,11 +24572,7 @@
             </a:r>
             <a:r>
               <a:rPr lang="et-EE" sz="1600" b="1" dirty="0" smtClean="0"/>
-              <a:t>Management </a:t>
-            </a:r>
-            <a:r>
-              <a:rPr lang="et-EE" sz="1600" b="1" dirty="0" smtClean="0"/>
-              <a:t>System</a:t>
+              <a:t>Management System</a:t>
             </a:r>
             <a:endParaRPr lang="en-US" sz="1600" b="1" dirty="0"/>
           </a:p>
@@ -24860,11 +24856,7 @@
             </a:pPr>
             <a:r>
               <a:rPr lang="en-US" sz="1600" dirty="0" err="1" smtClean="0"/>
-              <a:t>Warehouse</a:t>
-            </a:r>
-            <a:r>
-              <a:rPr lang="en-US" sz="1600" dirty="0" err="1" smtClean="0"/>
-              <a:t>Network</a:t>
+              <a:t>WarehouseNetwork</a:t>
             </a:r>
             <a:endParaRPr lang="en-US" sz="1600" dirty="0"/>
           </a:p>

</xml_diff>